<commit_message>
revised slides for Tue lecture
</commit_message>
<xml_diff>
--- a/Wi21_content/SEDS/L1.1.Command_Line.pptx
+++ b/Wi21_content/SEDS/L1.1.Command_Line.pptx
@@ -5,22 +5,24 @@
     <p:sldMasterId id="2147483648" r:id="rId1"/>
   </p:sldMasterIdLst>
   <p:notesMasterIdLst>
-    <p:notesMasterId r:id="rId15"/>
+    <p:notesMasterId r:id="rId17"/>
   </p:notesMasterIdLst>
   <p:sldIdLst>
     <p:sldId id="256" r:id="rId2"/>
-    <p:sldId id="434" r:id="rId3"/>
-    <p:sldId id="435" r:id="rId4"/>
-    <p:sldId id="433" r:id="rId5"/>
-    <p:sldId id="436" r:id="rId6"/>
-    <p:sldId id="437" r:id="rId7"/>
-    <p:sldId id="438" r:id="rId8"/>
-    <p:sldId id="439" r:id="rId9"/>
-    <p:sldId id="440" r:id="rId10"/>
-    <p:sldId id="445" r:id="rId11"/>
-    <p:sldId id="446" r:id="rId12"/>
-    <p:sldId id="441" r:id="rId13"/>
-    <p:sldId id="442" r:id="rId14"/>
+    <p:sldId id="431" r:id="rId3"/>
+    <p:sldId id="432" r:id="rId4"/>
+    <p:sldId id="434" r:id="rId5"/>
+    <p:sldId id="435" r:id="rId6"/>
+    <p:sldId id="433" r:id="rId7"/>
+    <p:sldId id="436" r:id="rId8"/>
+    <p:sldId id="437" r:id="rId9"/>
+    <p:sldId id="438" r:id="rId10"/>
+    <p:sldId id="439" r:id="rId11"/>
+    <p:sldId id="440" r:id="rId12"/>
+    <p:sldId id="445" r:id="rId13"/>
+    <p:sldId id="446" r:id="rId14"/>
+    <p:sldId id="441" r:id="rId15"/>
+    <p:sldId id="442" r:id="rId16"/>
   </p:sldIdLst>
   <p:sldSz cx="9144000" cy="6858000" type="screen4x3"/>
   <p:notesSz cx="6858000" cy="9144000"/>
@@ -237,7 +239,7 @@
           <a:p>
             <a:fld id="{08F62E20-B1AA-3442-B8F1-F4A56998389D}" type="datetimeFigureOut">
               <a:rPr lang="en-US" smtClean="0"/>
-              <a:t>1/8/20</a:t>
+              <a:t>1/4/21</a:t>
             </a:fld>
             <a:endParaRPr lang="en-US"/>
           </a:p>
@@ -662,7 +664,7 @@
     </p:spTree>
     <p:extLst>
       <p:ext uri="{BB962C8B-B14F-4D97-AF65-F5344CB8AC3E}">
-        <p14:creationId xmlns:p14="http://schemas.microsoft.com/office/powerpoint/2010/main" val="626842209"/>
+        <p14:creationId xmlns:p14="http://schemas.microsoft.com/office/powerpoint/2010/main" val="3379479252"/>
       </p:ext>
     </p:extLst>
   </p:cSld>
@@ -746,7 +748,7 @@
     </p:spTree>
     <p:extLst>
       <p:ext uri="{BB962C8B-B14F-4D97-AF65-F5344CB8AC3E}">
-        <p14:creationId xmlns:p14="http://schemas.microsoft.com/office/powerpoint/2010/main" val="1762663523"/>
+        <p14:creationId xmlns:p14="http://schemas.microsoft.com/office/powerpoint/2010/main" val="4133835080"/>
       </p:ext>
     </p:extLst>
   </p:cSld>
@@ -830,7 +832,7 @@
     </p:spTree>
     <p:extLst>
       <p:ext uri="{BB962C8B-B14F-4D97-AF65-F5344CB8AC3E}">
-        <p14:creationId xmlns:p14="http://schemas.microsoft.com/office/powerpoint/2010/main" val="1891843614"/>
+        <p14:creationId xmlns:p14="http://schemas.microsoft.com/office/powerpoint/2010/main" val="626842209"/>
       </p:ext>
     </p:extLst>
   </p:cSld>
@@ -905,7 +907,7 @@
           <a:p>
             <a:fld id="{90C4E4C1-AC8F-D74E-8D15-CAC414F5A92D}" type="slidenum">
               <a:rPr lang="en-US" smtClean="0"/>
-              <a:t>10</a:t>
+              <a:t>5</a:t>
             </a:fld>
             <a:endParaRPr lang="en-US"/>
           </a:p>
@@ -914,7 +916,7 @@
     </p:spTree>
     <p:extLst>
       <p:ext uri="{BB962C8B-B14F-4D97-AF65-F5344CB8AC3E}">
-        <p14:creationId xmlns:p14="http://schemas.microsoft.com/office/powerpoint/2010/main" val="108075008"/>
+        <p14:creationId xmlns:p14="http://schemas.microsoft.com/office/powerpoint/2010/main" val="1762663523"/>
       </p:ext>
     </p:extLst>
   </p:cSld>
@@ -989,7 +991,175 @@
           <a:p>
             <a:fld id="{90C4E4C1-AC8F-D74E-8D15-CAC414F5A92D}" type="slidenum">
               <a:rPr lang="en-US" smtClean="0"/>
-              <a:t>11</a:t>
+              <a:t>6</a:t>
+            </a:fld>
+            <a:endParaRPr lang="en-US"/>
+          </a:p>
+        </p:txBody>
+      </p:sp>
+    </p:spTree>
+    <p:extLst>
+      <p:ext uri="{BB962C8B-B14F-4D97-AF65-F5344CB8AC3E}">
+        <p14:creationId xmlns:p14="http://schemas.microsoft.com/office/powerpoint/2010/main" val="1891843614"/>
+      </p:ext>
+    </p:extLst>
+  </p:cSld>
+  <p:clrMapOvr>
+    <a:masterClrMapping/>
+  </p:clrMapOvr>
+</p:notes>
+</file>
+
+<file path=ppt/notesSlides/notesSlide7.xml><?xml version="1.0" encoding="utf-8"?>
+<p:notes xmlns:a="http://schemas.openxmlformats.org/drawingml/2006/main" xmlns:r="http://schemas.openxmlformats.org/officeDocument/2006/relationships" xmlns:p="http://schemas.openxmlformats.org/presentationml/2006/main">
+  <p:cSld>
+    <p:spTree>
+      <p:nvGrpSpPr>
+        <p:cNvPr id="1" name=""/>
+        <p:cNvGrpSpPr/>
+        <p:nvPr/>
+      </p:nvGrpSpPr>
+      <p:grpSpPr>
+        <a:xfrm>
+          <a:off x="0" y="0"/>
+          <a:ext cx="0" cy="0"/>
+          <a:chOff x="0" y="0"/>
+          <a:chExt cx="0" cy="0"/>
+        </a:xfrm>
+      </p:grpSpPr>
+      <p:sp>
+        <p:nvSpPr>
+          <p:cNvPr id="2" name="Slide Image Placeholder 1"/>
+          <p:cNvSpPr>
+            <a:spLocks noGrp="1" noRot="1" noChangeAspect="1"/>
+          </p:cNvSpPr>
+          <p:nvPr>
+            <p:ph type="sldImg"/>
+          </p:nvPr>
+        </p:nvSpPr>
+        <p:spPr/>
+      </p:sp>
+      <p:sp>
+        <p:nvSpPr>
+          <p:cNvPr id="3" name="Notes Placeholder 2"/>
+          <p:cNvSpPr>
+            <a:spLocks noGrp="1"/>
+          </p:cNvSpPr>
+          <p:nvPr>
+            <p:ph type="body" idx="1"/>
+          </p:nvPr>
+        </p:nvSpPr>
+        <p:spPr/>
+        <p:txBody>
+          <a:bodyPr/>
+          <a:lstStyle/>
+          <a:p>
+            <a:endParaRPr lang="en-US" dirty="0"/>
+          </a:p>
+        </p:txBody>
+      </p:sp>
+      <p:sp>
+        <p:nvSpPr>
+          <p:cNvPr id="4" name="Slide Number Placeholder 3"/>
+          <p:cNvSpPr>
+            <a:spLocks noGrp="1"/>
+          </p:cNvSpPr>
+          <p:nvPr>
+            <p:ph type="sldNum" sz="quarter" idx="10"/>
+          </p:nvPr>
+        </p:nvSpPr>
+        <p:spPr/>
+        <p:txBody>
+          <a:bodyPr/>
+          <a:lstStyle/>
+          <a:p>
+            <a:fld id="{90C4E4C1-AC8F-D74E-8D15-CAC414F5A92D}" type="slidenum">
+              <a:rPr lang="en-US" smtClean="0"/>
+              <a:t>12</a:t>
+            </a:fld>
+            <a:endParaRPr lang="en-US"/>
+          </a:p>
+        </p:txBody>
+      </p:sp>
+    </p:spTree>
+    <p:extLst>
+      <p:ext uri="{BB962C8B-B14F-4D97-AF65-F5344CB8AC3E}">
+        <p14:creationId xmlns:p14="http://schemas.microsoft.com/office/powerpoint/2010/main" val="108075008"/>
+      </p:ext>
+    </p:extLst>
+  </p:cSld>
+  <p:clrMapOvr>
+    <a:masterClrMapping/>
+  </p:clrMapOvr>
+</p:notes>
+</file>
+
+<file path=ppt/notesSlides/notesSlide8.xml><?xml version="1.0" encoding="utf-8"?>
+<p:notes xmlns:a="http://schemas.openxmlformats.org/drawingml/2006/main" xmlns:r="http://schemas.openxmlformats.org/officeDocument/2006/relationships" xmlns:p="http://schemas.openxmlformats.org/presentationml/2006/main">
+  <p:cSld>
+    <p:spTree>
+      <p:nvGrpSpPr>
+        <p:cNvPr id="1" name=""/>
+        <p:cNvGrpSpPr/>
+        <p:nvPr/>
+      </p:nvGrpSpPr>
+      <p:grpSpPr>
+        <a:xfrm>
+          <a:off x="0" y="0"/>
+          <a:ext cx="0" cy="0"/>
+          <a:chOff x="0" y="0"/>
+          <a:chExt cx="0" cy="0"/>
+        </a:xfrm>
+      </p:grpSpPr>
+      <p:sp>
+        <p:nvSpPr>
+          <p:cNvPr id="2" name="Slide Image Placeholder 1"/>
+          <p:cNvSpPr>
+            <a:spLocks noGrp="1" noRot="1" noChangeAspect="1"/>
+          </p:cNvSpPr>
+          <p:nvPr>
+            <p:ph type="sldImg"/>
+          </p:nvPr>
+        </p:nvSpPr>
+        <p:spPr/>
+      </p:sp>
+      <p:sp>
+        <p:nvSpPr>
+          <p:cNvPr id="3" name="Notes Placeholder 2"/>
+          <p:cNvSpPr>
+            <a:spLocks noGrp="1"/>
+          </p:cNvSpPr>
+          <p:nvPr>
+            <p:ph type="body" idx="1"/>
+          </p:nvPr>
+        </p:nvSpPr>
+        <p:spPr/>
+        <p:txBody>
+          <a:bodyPr/>
+          <a:lstStyle/>
+          <a:p>
+            <a:endParaRPr lang="en-US" dirty="0"/>
+          </a:p>
+        </p:txBody>
+      </p:sp>
+      <p:sp>
+        <p:nvSpPr>
+          <p:cNvPr id="4" name="Slide Number Placeholder 3"/>
+          <p:cNvSpPr>
+            <a:spLocks noGrp="1"/>
+          </p:cNvSpPr>
+          <p:nvPr>
+            <p:ph type="sldNum" sz="quarter" idx="10"/>
+          </p:nvPr>
+        </p:nvSpPr>
+        <p:spPr/>
+        <p:txBody>
+          <a:bodyPr/>
+          <a:lstStyle/>
+          <a:p>
+            <a:fld id="{90C4E4C1-AC8F-D74E-8D15-CAC414F5A92D}" type="slidenum">
+              <a:rPr lang="en-US" smtClean="0"/>
+              <a:t>13</a:t>
             </a:fld>
             <a:endParaRPr lang="en-US"/>
           </a:p>
@@ -1195,7 +1365,7 @@
           <a:p>
             <a:fld id="{2691D6E4-0F7A-0249-86EF-226720E50E4C}" type="datetimeFigureOut">
               <a:rPr lang="en-US" smtClean="0"/>
-              <a:t>1/8/20</a:t>
+              <a:t>1/4/21</a:t>
             </a:fld>
             <a:endParaRPr lang="en-US"/>
           </a:p>
@@ -1387,7 +1557,7 @@
           <a:p>
             <a:fld id="{2691D6E4-0F7A-0249-86EF-226720E50E4C}" type="datetimeFigureOut">
               <a:rPr lang="en-US" smtClean="0"/>
-              <a:t>1/8/20</a:t>
+              <a:t>1/4/21</a:t>
             </a:fld>
             <a:endParaRPr lang="en-US"/>
           </a:p>
@@ -1589,7 +1759,7 @@
           <a:p>
             <a:fld id="{2691D6E4-0F7A-0249-86EF-226720E50E4C}" type="datetimeFigureOut">
               <a:rPr lang="en-US" smtClean="0"/>
-              <a:t>1/8/20</a:t>
+              <a:t>1/4/21</a:t>
             </a:fld>
             <a:endParaRPr lang="en-US"/>
           </a:p>
@@ -1781,7 +1951,7 @@
           <a:p>
             <a:fld id="{2691D6E4-0F7A-0249-86EF-226720E50E4C}" type="datetimeFigureOut">
               <a:rPr lang="en-US" smtClean="0"/>
-              <a:t>1/8/20</a:t>
+              <a:t>1/4/21</a:t>
             </a:fld>
             <a:endParaRPr lang="en-US"/>
           </a:p>
@@ -2050,7 +2220,7 @@
           <a:p>
             <a:fld id="{2691D6E4-0F7A-0249-86EF-226720E50E4C}" type="datetimeFigureOut">
               <a:rPr lang="en-US" smtClean="0"/>
-              <a:t>1/8/20</a:t>
+              <a:t>1/4/21</a:t>
             </a:fld>
             <a:endParaRPr lang="en-US"/>
           </a:p>
@@ -2359,7 +2529,7 @@
           <a:p>
             <a:fld id="{2691D6E4-0F7A-0249-86EF-226720E50E4C}" type="datetimeFigureOut">
               <a:rPr lang="en-US" smtClean="0"/>
-              <a:t>1/8/20</a:t>
+              <a:t>1/4/21</a:t>
             </a:fld>
             <a:endParaRPr lang="en-US"/>
           </a:p>
@@ -2802,7 +2972,7 @@
           <a:p>
             <a:fld id="{2691D6E4-0F7A-0249-86EF-226720E50E4C}" type="datetimeFigureOut">
               <a:rPr lang="en-US" smtClean="0"/>
-              <a:t>1/8/20</a:t>
+              <a:t>1/4/21</a:t>
             </a:fld>
             <a:endParaRPr lang="en-US"/>
           </a:p>
@@ -2943,7 +3113,7 @@
           <a:p>
             <a:fld id="{2691D6E4-0F7A-0249-86EF-226720E50E4C}" type="datetimeFigureOut">
               <a:rPr lang="en-US" smtClean="0"/>
-              <a:t>1/8/20</a:t>
+              <a:t>1/4/21</a:t>
             </a:fld>
             <a:endParaRPr lang="en-US"/>
           </a:p>
@@ -3062,7 +3232,7 @@
           <a:p>
             <a:fld id="{2691D6E4-0F7A-0249-86EF-226720E50E4C}" type="datetimeFigureOut">
               <a:rPr lang="en-US" smtClean="0"/>
-              <a:t>1/8/20</a:t>
+              <a:t>1/4/21</a:t>
             </a:fld>
             <a:endParaRPr lang="en-US"/>
           </a:p>
@@ -3361,7 +3531,7 @@
           <a:p>
             <a:fld id="{2691D6E4-0F7A-0249-86EF-226720E50E4C}" type="datetimeFigureOut">
               <a:rPr lang="en-US" smtClean="0"/>
-              <a:t>1/8/20</a:t>
+              <a:t>1/4/21</a:t>
             </a:fld>
             <a:endParaRPr lang="en-US"/>
           </a:p>
@@ -3637,7 +3807,7 @@
           <a:p>
             <a:fld id="{2691D6E4-0F7A-0249-86EF-226720E50E4C}" type="datetimeFigureOut">
               <a:rPr lang="en-US" smtClean="0"/>
-              <a:t>1/8/20</a:t>
+              <a:t>1/4/21</a:t>
             </a:fld>
             <a:endParaRPr lang="en-US"/>
           </a:p>
@@ -4739,6 +4909,369 @@
         </p:nvSpPr>
         <p:spPr/>
         <p:txBody>
+          <a:bodyPr/>
+          <a:lstStyle/>
+          <a:p>
+            <a:r>
+              <a:rPr lang="en-US" dirty="0"/>
+              <a:t>Command line tips and tricks</a:t>
+            </a:r>
+          </a:p>
+        </p:txBody>
+      </p:sp>
+      <p:sp>
+        <p:nvSpPr>
+          <p:cNvPr id="3" name="Content Placeholder 2"/>
+          <p:cNvSpPr>
+            <a:spLocks noGrp="1"/>
+          </p:cNvSpPr>
+          <p:nvPr>
+            <p:ph idx="1"/>
+          </p:nvPr>
+        </p:nvSpPr>
+        <p:spPr/>
+        <p:txBody>
+          <a:bodyPr/>
+          <a:lstStyle/>
+          <a:p>
+            <a:r>
+              <a:rPr lang="en-US" dirty="0"/>
+              <a:t>Tab completion is your friend</a:t>
+            </a:r>
+          </a:p>
+          <a:p>
+            <a:pPr lvl="1"/>
+            <a:r>
+              <a:rPr lang="en-US" dirty="0"/>
+              <a:t>When entering a file arguments</a:t>
+            </a:r>
+          </a:p>
+          <a:p>
+            <a:pPr lvl="1"/>
+            <a:r>
+              <a:rPr lang="en-US" dirty="0"/>
+              <a:t>When entering directory </a:t>
+            </a:r>
+            <a:r>
+              <a:rPr lang="en-US" dirty="0" err="1"/>
+              <a:t>pathes</a:t>
+            </a:r>
+            <a:endParaRPr lang="en-US" dirty="0"/>
+          </a:p>
+          <a:p>
+            <a:pPr lvl="1"/>
+            <a:r>
+              <a:rPr lang="en-US" dirty="0"/>
+              <a:t>Hitting tab will autocomplete the filename!</a:t>
+            </a:r>
+          </a:p>
+          <a:p>
+            <a:pPr lvl="1"/>
+            <a:endParaRPr lang="en-US" dirty="0"/>
+          </a:p>
+          <a:p>
+            <a:pPr lvl="1"/>
+            <a:r>
+              <a:rPr lang="en-US" dirty="0"/>
+              <a:t>I will pester you about this</a:t>
+            </a:r>
+          </a:p>
+        </p:txBody>
+      </p:sp>
+      <p:pic>
+        <p:nvPicPr>
+          <p:cNvPr id="4" name="Picture 3"/>
+          <p:cNvPicPr>
+            <a:picLocks noChangeAspect="1"/>
+          </p:cNvPicPr>
+          <p:nvPr/>
+        </p:nvPicPr>
+        <p:blipFill>
+          <a:blip r:embed="rId2"/>
+          <a:stretch>
+            <a:fillRect/>
+          </a:stretch>
+        </p:blipFill>
+        <p:spPr>
+          <a:xfrm>
+            <a:off x="5912720" y="3804634"/>
+            <a:ext cx="2679700" cy="3035300"/>
+          </a:xfrm>
+          <a:prstGeom prst="rect">
+            <a:avLst/>
+          </a:prstGeom>
+        </p:spPr>
+      </p:pic>
+    </p:spTree>
+    <p:extLst>
+      <p:ext uri="{BB962C8B-B14F-4D97-AF65-F5344CB8AC3E}">
+        <p14:creationId xmlns:p14="http://schemas.microsoft.com/office/powerpoint/2010/main" val="1587552421"/>
+      </p:ext>
+    </p:extLst>
+  </p:cSld>
+  <p:clrMapOvr>
+    <a:masterClrMapping/>
+  </p:clrMapOvr>
+</p:sld>
+</file>
+
+<file path=ppt/slides/slide11.xml><?xml version="1.0" encoding="utf-8"?>
+<p:sld xmlns:a="http://schemas.openxmlformats.org/drawingml/2006/main" xmlns:r="http://schemas.openxmlformats.org/officeDocument/2006/relationships" xmlns:p="http://schemas.openxmlformats.org/presentationml/2006/main">
+  <p:cSld>
+    <p:spTree>
+      <p:nvGrpSpPr>
+        <p:cNvPr id="1" name=""/>
+        <p:cNvGrpSpPr/>
+        <p:nvPr/>
+      </p:nvGrpSpPr>
+      <p:grpSpPr>
+        <a:xfrm>
+          <a:off x="0" y="0"/>
+          <a:ext cx="0" cy="0"/>
+          <a:chOff x="0" y="0"/>
+          <a:chExt cx="0" cy="0"/>
+        </a:xfrm>
+      </p:grpSpPr>
+      <p:sp>
+        <p:nvSpPr>
+          <p:cNvPr id="2" name="Title 1"/>
+          <p:cNvSpPr>
+            <a:spLocks noGrp="1"/>
+          </p:cNvSpPr>
+          <p:nvPr>
+            <p:ph type="title"/>
+          </p:nvPr>
+        </p:nvSpPr>
+        <p:spPr/>
+        <p:txBody>
+          <a:bodyPr/>
+          <a:lstStyle/>
+          <a:p>
+            <a:r>
+              <a:rPr lang="en-US" altLang="x-none" dirty="0"/>
+              <a:t>Commands for files &amp; </a:t>
+            </a:r>
+            <a:r>
+              <a:rPr lang="en-US" altLang="x-none" dirty="0" err="1"/>
+              <a:t>dirs</a:t>
+            </a:r>
+            <a:endParaRPr lang="en-US" dirty="0"/>
+          </a:p>
+        </p:txBody>
+      </p:sp>
+      <p:sp>
+        <p:nvSpPr>
+          <p:cNvPr id="3" name="Content Placeholder 2"/>
+          <p:cNvSpPr>
+            <a:spLocks noGrp="1"/>
+          </p:cNvSpPr>
+          <p:nvPr>
+            <p:ph idx="1"/>
+          </p:nvPr>
+        </p:nvSpPr>
+        <p:spPr/>
+        <p:txBody>
+          <a:bodyPr/>
+          <a:lstStyle/>
+          <a:p>
+            <a:pPr marL="457200" indent="-457200">
+              <a:buFont typeface="Arial" charset="0"/>
+              <a:buChar char="•"/>
+            </a:pPr>
+            <a:r>
+              <a:rPr lang="en-US" altLang="x-none" dirty="0"/>
+              <a:t>By category</a:t>
+            </a:r>
+          </a:p>
+          <a:p>
+            <a:pPr marL="857250" lvl="1" indent="-457200">
+              <a:buFont typeface="Arial" charset="0"/>
+              <a:buChar char="•"/>
+            </a:pPr>
+            <a:r>
+              <a:rPr lang="en-US" altLang="x-none" dirty="0"/>
+              <a:t>Create</a:t>
+            </a:r>
+          </a:p>
+          <a:p>
+            <a:pPr marL="1257300" lvl="2" indent="-457200">
+              <a:buFont typeface="Arial" charset="0"/>
+              <a:buChar char="•"/>
+            </a:pPr>
+            <a:r>
+              <a:rPr lang="en-US" altLang="x-none" dirty="0"/>
+              <a:t>Directory: </a:t>
+            </a:r>
+            <a:r>
+              <a:rPr lang="en-US" altLang="x-none" dirty="0" err="1">
+                <a:latin typeface="Courier New" charset="0"/>
+              </a:rPr>
+              <a:t>mkdir</a:t>
+            </a:r>
+            <a:endParaRPr lang="en-US" altLang="x-none" dirty="0">
+              <a:latin typeface="Courier New" charset="0"/>
+            </a:endParaRPr>
+          </a:p>
+          <a:p>
+            <a:pPr marL="1257300" lvl="2" indent="-457200">
+              <a:buFont typeface="Arial" charset="0"/>
+              <a:buChar char="•"/>
+            </a:pPr>
+            <a:r>
+              <a:rPr lang="en-US" altLang="x-none" dirty="0"/>
+              <a:t>File: various (e.g., </a:t>
+            </a:r>
+            <a:r>
+              <a:rPr lang="en-US" altLang="x-none" dirty="0" err="1">
+                <a:latin typeface="Courier New" charset="0"/>
+              </a:rPr>
+              <a:t>cp</a:t>
+            </a:r>
+            <a:r>
+              <a:rPr lang="en-US" altLang="x-none" dirty="0">
+                <a:latin typeface="Courier New" charset="0"/>
+              </a:rPr>
+              <a:t>, touch</a:t>
+            </a:r>
+            <a:r>
+              <a:rPr lang="en-US" altLang="x-none" dirty="0"/>
+              <a:t>)</a:t>
+            </a:r>
+          </a:p>
+          <a:p>
+            <a:pPr marL="857250" lvl="1" indent="-457200">
+              <a:buFont typeface="Arial" charset="0"/>
+              <a:buChar char="•"/>
+            </a:pPr>
+            <a:r>
+              <a:rPr lang="en-US" altLang="x-none" dirty="0"/>
+              <a:t>View contents</a:t>
+            </a:r>
+          </a:p>
+          <a:p>
+            <a:pPr marL="1257300" lvl="2" indent="-457200">
+              <a:buFont typeface="Arial" charset="0"/>
+              <a:buChar char="•"/>
+            </a:pPr>
+            <a:r>
+              <a:rPr lang="en-US" altLang="x-none" dirty="0"/>
+              <a:t>Directory: </a:t>
+            </a:r>
+            <a:r>
+              <a:rPr lang="en-US" altLang="x-none" dirty="0">
+                <a:latin typeface="Courier New" charset="0"/>
+              </a:rPr>
+              <a:t>ls</a:t>
+            </a:r>
+          </a:p>
+          <a:p>
+            <a:pPr marL="1257300" lvl="2" indent="-457200">
+              <a:buFont typeface="Arial" charset="0"/>
+              <a:buChar char="•"/>
+            </a:pPr>
+            <a:r>
+              <a:rPr lang="en-US" altLang="x-none" dirty="0"/>
+              <a:t>File: </a:t>
+            </a:r>
+            <a:r>
+              <a:rPr lang="en-US" altLang="x-none" dirty="0">
+                <a:latin typeface="Courier New" charset="0"/>
+              </a:rPr>
+              <a:t>cat</a:t>
+            </a:r>
+          </a:p>
+          <a:p>
+            <a:pPr marL="857250" lvl="1" indent="-457200">
+              <a:buFont typeface="Arial" charset="0"/>
+              <a:buChar char="•"/>
+            </a:pPr>
+            <a:r>
+              <a:rPr lang="en-US" altLang="x-none" dirty="0"/>
+              <a:t>Remove</a:t>
+            </a:r>
+          </a:p>
+          <a:p>
+            <a:pPr marL="1257300" lvl="2" indent="-457200">
+              <a:buFont typeface="Arial" charset="0"/>
+              <a:buChar char="•"/>
+            </a:pPr>
+            <a:r>
+              <a:rPr lang="en-US" altLang="x-none" dirty="0"/>
+              <a:t>Directory: </a:t>
+            </a:r>
+            <a:r>
+              <a:rPr lang="en-US" altLang="x-none" dirty="0" err="1">
+                <a:latin typeface="Courier New" charset="0"/>
+              </a:rPr>
+              <a:t>rmdir</a:t>
+            </a:r>
+            <a:endParaRPr lang="en-US" altLang="x-none" dirty="0">
+              <a:latin typeface="Courier New" charset="0"/>
+            </a:endParaRPr>
+          </a:p>
+          <a:p>
+            <a:pPr marL="1257300" lvl="2" indent="-457200">
+              <a:buFont typeface="Arial" charset="0"/>
+              <a:buChar char="•"/>
+            </a:pPr>
+            <a:r>
+              <a:rPr lang="en-US" altLang="x-none" dirty="0"/>
+              <a:t>File: </a:t>
+            </a:r>
+            <a:r>
+              <a:rPr lang="en-US" altLang="x-none" dirty="0" err="1">
+                <a:latin typeface="Courier New" charset="0"/>
+              </a:rPr>
+              <a:t>rm</a:t>
+            </a:r>
+            <a:endParaRPr lang="en-US" altLang="x-none" dirty="0">
+              <a:latin typeface="Courier New" charset="0"/>
+            </a:endParaRPr>
+          </a:p>
+        </p:txBody>
+      </p:sp>
+    </p:spTree>
+    <p:extLst>
+      <p:ext uri="{BB962C8B-B14F-4D97-AF65-F5344CB8AC3E}">
+        <p14:creationId xmlns:p14="http://schemas.microsoft.com/office/powerpoint/2010/main" val="1184325561"/>
+      </p:ext>
+    </p:extLst>
+  </p:cSld>
+  <p:clrMapOvr>
+    <a:masterClrMapping/>
+  </p:clrMapOvr>
+</p:sld>
+</file>
+
+<file path=ppt/slides/slide12.xml><?xml version="1.0" encoding="utf-8"?>
+<p:sld xmlns:a="http://schemas.openxmlformats.org/drawingml/2006/main" xmlns:r="http://schemas.openxmlformats.org/officeDocument/2006/relationships" xmlns:p="http://schemas.openxmlformats.org/presentationml/2006/main">
+  <p:cSld>
+    <p:spTree>
+      <p:nvGrpSpPr>
+        <p:cNvPr id="1" name=""/>
+        <p:cNvGrpSpPr/>
+        <p:nvPr/>
+      </p:nvGrpSpPr>
+      <p:grpSpPr>
+        <a:xfrm>
+          <a:off x="0" y="0"/>
+          <a:ext cx="0" cy="0"/>
+          <a:chOff x="0" y="0"/>
+          <a:chExt cx="0" cy="0"/>
+        </a:xfrm>
+      </p:grpSpPr>
+      <p:sp>
+        <p:nvSpPr>
+          <p:cNvPr id="2" name="Title 1"/>
+          <p:cNvSpPr>
+            <a:spLocks noGrp="1"/>
+          </p:cNvSpPr>
+          <p:nvPr>
+            <p:ph type="title"/>
+          </p:nvPr>
+        </p:nvSpPr>
+        <p:spPr/>
+        <p:txBody>
           <a:bodyPr>
             <a:normAutofit/>
           </a:bodyPr>
@@ -6020,7 +6553,7 @@
 </p:sld>
 </file>
 
-<file path=ppt/slides/slide11.xml><?xml version="1.0" encoding="utf-8"?>
+<file path=ppt/slides/slide13.xml><?xml version="1.0" encoding="utf-8"?>
 <p:sld xmlns:a="http://schemas.openxmlformats.org/drawingml/2006/main" xmlns:r="http://schemas.openxmlformats.org/officeDocument/2006/relationships" xmlns:p="http://schemas.openxmlformats.org/presentationml/2006/main">
   <p:cSld>
     <p:spTree>
@@ -6143,7 +6676,7 @@
 </p:sld>
 </file>
 
-<file path=ppt/slides/slide12.xml><?xml version="1.0" encoding="utf-8"?>
+<file path=ppt/slides/slide14.xml><?xml version="1.0" encoding="utf-8"?>
 <p:sld xmlns:a="http://schemas.openxmlformats.org/drawingml/2006/main" xmlns:r="http://schemas.openxmlformats.org/officeDocument/2006/relationships" xmlns:p="http://schemas.openxmlformats.org/presentationml/2006/main">
   <p:cSld>
     <p:spTree>
@@ -6257,7 +6790,7 @@
 </p:sld>
 </file>
 
-<file path=ppt/slides/slide13.xml><?xml version="1.0" encoding="utf-8"?>
+<file path=ppt/slides/slide15.xml><?xml version="1.0" encoding="utf-8"?>
 <p:sld xmlns:a="http://schemas.openxmlformats.org/drawingml/2006/main" xmlns:r="http://schemas.openxmlformats.org/officeDocument/2006/relationships" xmlns:p="http://schemas.openxmlformats.org/presentationml/2006/main">
   <p:cSld>
     <p:spTree>
@@ -7799,6 +8332,1439 @@
 </file>
 
 <file path=ppt/slides/slide2.xml><?xml version="1.0" encoding="utf-8"?>
+<p:sld xmlns:a="http://schemas.openxmlformats.org/drawingml/2006/main" xmlns:r="http://schemas.openxmlformats.org/officeDocument/2006/relationships" xmlns:p="http://schemas.openxmlformats.org/presentationml/2006/main">
+  <p:cSld>
+    <p:spTree>
+      <p:nvGrpSpPr>
+        <p:cNvPr id="1" name=""/>
+        <p:cNvGrpSpPr/>
+        <p:nvPr/>
+      </p:nvGrpSpPr>
+      <p:grpSpPr>
+        <a:xfrm>
+          <a:off x="0" y="0"/>
+          <a:ext cx="0" cy="0"/>
+          <a:chOff x="0" y="0"/>
+          <a:chExt cx="0" cy="0"/>
+        </a:xfrm>
+      </p:grpSpPr>
+      <p:sp>
+        <p:nvSpPr>
+          <p:cNvPr id="2" name="Title 1"/>
+          <p:cNvSpPr>
+            <a:spLocks noGrp="1"/>
+          </p:cNvSpPr>
+          <p:nvPr>
+            <p:ph type="title"/>
+          </p:nvPr>
+        </p:nvSpPr>
+        <p:spPr/>
+        <p:txBody>
+          <a:bodyPr>
+            <a:normAutofit/>
+          </a:bodyPr>
+          <a:lstStyle/>
+          <a:p>
+            <a:r>
+              <a:rPr lang="en-US" dirty="0"/>
+              <a:t>Data!</a:t>
+            </a:r>
+          </a:p>
+        </p:txBody>
+      </p:sp>
+      <p:graphicFrame>
+        <p:nvGraphicFramePr>
+          <p:cNvPr id="3" name="Content Placeholder 2"/>
+          <p:cNvGraphicFramePr>
+            <a:graphicFrameLocks noGrp="1"/>
+          </p:cNvGraphicFramePr>
+          <p:nvPr>
+            <p:ph idx="1"/>
+            <p:extLst/>
+          </p:nvPr>
+        </p:nvGraphicFramePr>
+        <p:xfrm>
+          <a:off x="457200" y="2163872"/>
+          <a:ext cx="8229600" cy="4450080"/>
+        </p:xfrm>
+        <a:graphic>
+          <a:graphicData uri="http://schemas.openxmlformats.org/drawingml/2006/table">
+            <a:tbl>
+              <a:tblPr firstRow="1" bandRow="1">
+                <a:tableStyleId>{5C22544A-7EE6-4342-B048-85BDC9FD1C3A}</a:tableStyleId>
+              </a:tblPr>
+              <a:tblGrid>
+                <a:gridCol w="2057400">
+                  <a:extLst>
+                    <a:ext uri="{9D8B030D-6E8A-4147-A177-3AD203B41FA5}">
+                      <a16:colId xmlns:a16="http://schemas.microsoft.com/office/drawing/2014/main" val="20000"/>
+                    </a:ext>
+                  </a:extLst>
+                </a:gridCol>
+                <a:gridCol w="2057400">
+                  <a:extLst>
+                    <a:ext uri="{9D8B030D-6E8A-4147-A177-3AD203B41FA5}">
+                      <a16:colId xmlns:a16="http://schemas.microsoft.com/office/drawing/2014/main" val="20001"/>
+                    </a:ext>
+                  </a:extLst>
+                </a:gridCol>
+                <a:gridCol w="2057400">
+                  <a:extLst>
+                    <a:ext uri="{9D8B030D-6E8A-4147-A177-3AD203B41FA5}">
+                      <a16:colId xmlns:a16="http://schemas.microsoft.com/office/drawing/2014/main" val="20002"/>
+                    </a:ext>
+                  </a:extLst>
+                </a:gridCol>
+                <a:gridCol w="2057400">
+                  <a:extLst>
+                    <a:ext uri="{9D8B030D-6E8A-4147-A177-3AD203B41FA5}">
+                      <a16:colId xmlns:a16="http://schemas.microsoft.com/office/drawing/2014/main" val="20003"/>
+                    </a:ext>
+                  </a:extLst>
+                </a:gridCol>
+              </a:tblGrid>
+              <a:tr h="370840">
+                <a:tc>
+                  <a:txBody>
+                    <a:bodyPr/>
+                    <a:lstStyle/>
+                    <a:p>
+                      <a:r>
+                        <a:rPr lang="en-US" dirty="0"/>
+                        <a:t>Variable / column</a:t>
+                      </a:r>
+                    </a:p>
+                  </a:txBody>
+                  <a:tcPr/>
+                </a:tc>
+                <a:tc>
+                  <a:txBody>
+                    <a:bodyPr/>
+                    <a:lstStyle/>
+                    <a:p>
+                      <a:r>
+                        <a:rPr lang="en-US" dirty="0"/>
+                        <a:t>Data</a:t>
+                      </a:r>
+                      <a:r>
+                        <a:rPr lang="en-US" baseline="0" dirty="0"/>
+                        <a:t> type</a:t>
+                      </a:r>
+                      <a:endParaRPr lang="en-US" dirty="0"/>
+                    </a:p>
+                  </a:txBody>
+                  <a:tcPr/>
+                </a:tc>
+                <a:tc>
+                  <a:txBody>
+                    <a:bodyPr/>
+                    <a:lstStyle/>
+                    <a:p>
+                      <a:r>
+                        <a:rPr lang="en-US" dirty="0"/>
+                        <a:t>Units / description</a:t>
+                      </a:r>
+                    </a:p>
+                  </a:txBody>
+                  <a:tcPr/>
+                </a:tc>
+                <a:tc>
+                  <a:txBody>
+                    <a:bodyPr/>
+                    <a:lstStyle/>
+                    <a:p>
+                      <a:r>
+                        <a:rPr lang="en-US" dirty="0"/>
+                        <a:t>Example</a:t>
+                      </a:r>
+                    </a:p>
+                  </a:txBody>
+                  <a:tcPr/>
+                </a:tc>
+                <a:extLst>
+                  <a:ext uri="{0D108BD9-81ED-4DB2-BD59-A6C34878D82A}">
+                    <a16:rowId xmlns:a16="http://schemas.microsoft.com/office/drawing/2014/main" val="10000"/>
+                  </a:ext>
+                </a:extLst>
+              </a:tr>
+              <a:tr h="370840">
+                <a:tc>
+                  <a:txBody>
+                    <a:bodyPr/>
+                    <a:lstStyle/>
+                    <a:p>
+                      <a:r>
+                        <a:rPr lang="en-US" dirty="0"/>
+                        <a:t>id</a:t>
+                      </a:r>
+                    </a:p>
+                  </a:txBody>
+                  <a:tcPr/>
+                </a:tc>
+                <a:tc>
+                  <a:txBody>
+                    <a:bodyPr/>
+                    <a:lstStyle/>
+                    <a:p>
+                      <a:r>
+                        <a:rPr lang="en-US" dirty="0"/>
+                        <a:t>integer</a:t>
+                      </a:r>
+                    </a:p>
+                  </a:txBody>
+                  <a:tcPr/>
+                </a:tc>
+                <a:tc>
+                  <a:txBody>
+                    <a:bodyPr/>
+                    <a:lstStyle/>
+                    <a:p>
+                      <a:r>
+                        <a:rPr lang="en-US" dirty="0"/>
+                        <a:t>CEPD id code</a:t>
+                      </a:r>
+                    </a:p>
+                  </a:txBody>
+                  <a:tcPr/>
+                </a:tc>
+                <a:tc>
+                  <a:txBody>
+                    <a:bodyPr/>
+                    <a:lstStyle/>
+                    <a:p>
+                      <a:pPr marL="0" marR="0" indent="0" algn="l" defTabSz="457200" rtl="0" eaLnBrk="1" fontAlgn="auto" latinLnBrk="0" hangingPunct="1">
+                        <a:lnSpc>
+                          <a:spcPct val="100000"/>
+                        </a:lnSpc>
+                        <a:spcBef>
+                          <a:spcPts val="0"/>
+                        </a:spcBef>
+                        <a:spcAft>
+                          <a:spcPts val="0"/>
+                        </a:spcAft>
+                        <a:buClrTx/>
+                        <a:buSzTx/>
+                        <a:buFontTx/>
+                        <a:buNone/>
+                        <a:tabLst/>
+                        <a:defRPr/>
+                      </a:pPr>
+                      <a:r>
+                        <a:rPr lang="cs-CZ" sz="1800" kern="1200" dirty="0">
+                          <a:solidFill>
+                            <a:schemeClr val="dk1"/>
+                          </a:solidFill>
+                          <a:effectLst/>
+                          <a:latin typeface="+mn-lt"/>
+                          <a:ea typeface="+mn-ea"/>
+                          <a:cs typeface="+mn-cs"/>
+                        </a:rPr>
+                        <a:t>655365</a:t>
+                      </a:r>
+                    </a:p>
+                  </a:txBody>
+                  <a:tcPr/>
+                </a:tc>
+                <a:extLst>
+                  <a:ext uri="{0D108BD9-81ED-4DB2-BD59-A6C34878D82A}">
+                    <a16:rowId xmlns:a16="http://schemas.microsoft.com/office/drawing/2014/main" val="10001"/>
+                  </a:ext>
+                </a:extLst>
+              </a:tr>
+              <a:tr h="370840">
+                <a:tc>
+                  <a:txBody>
+                    <a:bodyPr/>
+                    <a:lstStyle/>
+                    <a:p>
+                      <a:r>
+                        <a:rPr lang="en-US" dirty="0" err="1"/>
+                        <a:t>SMILES_str</a:t>
+                      </a:r>
+                      <a:endParaRPr lang="en-US" dirty="0"/>
+                    </a:p>
+                  </a:txBody>
+                  <a:tcPr/>
+                </a:tc>
+                <a:tc>
+                  <a:txBody>
+                    <a:bodyPr/>
+                    <a:lstStyle/>
+                    <a:p>
+                      <a:r>
+                        <a:rPr lang="en-US" dirty="0"/>
+                        <a:t>string</a:t>
+                      </a:r>
+                    </a:p>
+                  </a:txBody>
+                  <a:tcPr/>
+                </a:tc>
+                <a:tc>
+                  <a:txBody>
+                    <a:bodyPr/>
+                    <a:lstStyle/>
+                    <a:p>
+                      <a:r>
+                        <a:rPr lang="en-US" dirty="0">
+                          <a:hlinkClick r:id="rId3"/>
+                        </a:rPr>
+                        <a:t>SMILES</a:t>
+                      </a:r>
+                      <a:endParaRPr lang="en-US" dirty="0"/>
+                    </a:p>
+                  </a:txBody>
+                  <a:tcPr/>
+                </a:tc>
+                <a:tc>
+                  <a:txBody>
+                    <a:bodyPr/>
+                    <a:lstStyle/>
+                    <a:p>
+                      <a:pPr marL="0" marR="0" indent="0" algn="l" defTabSz="457200" rtl="0" eaLnBrk="1" fontAlgn="auto" latinLnBrk="0" hangingPunct="1">
+                        <a:lnSpc>
+                          <a:spcPct val="100000"/>
+                        </a:lnSpc>
+                        <a:spcBef>
+                          <a:spcPts val="0"/>
+                        </a:spcBef>
+                        <a:spcAft>
+                          <a:spcPts val="0"/>
+                        </a:spcAft>
+                        <a:buClrTx/>
+                        <a:buSzTx/>
+                        <a:buFontTx/>
+                        <a:buNone/>
+                        <a:tabLst/>
+                        <a:defRPr/>
+                      </a:pPr>
+                      <a:r>
+                        <a:rPr lang="en-US" sz="1800" kern="1200" dirty="0">
+                          <a:solidFill>
+                            <a:schemeClr val="dk1"/>
+                          </a:solidFill>
+                          <a:effectLst/>
+                          <a:latin typeface="+mn-lt"/>
+                          <a:ea typeface="+mn-ea"/>
+                          <a:cs typeface="+mn-cs"/>
+                        </a:rPr>
+                        <a:t>C1C=CC=C1c1cc2</a:t>
+                      </a:r>
+                    </a:p>
+                  </a:txBody>
+                  <a:tcPr/>
+                </a:tc>
+                <a:extLst>
+                  <a:ext uri="{0D108BD9-81ED-4DB2-BD59-A6C34878D82A}">
+                    <a16:rowId xmlns:a16="http://schemas.microsoft.com/office/drawing/2014/main" val="10002"/>
+                  </a:ext>
+                </a:extLst>
+              </a:tr>
+              <a:tr h="370840">
+                <a:tc>
+                  <a:txBody>
+                    <a:bodyPr/>
+                    <a:lstStyle/>
+                    <a:p>
+                      <a:r>
+                        <a:rPr lang="en-US" dirty="0" err="1"/>
+                        <a:t>stoich_str</a:t>
+                      </a:r>
+                      <a:endParaRPr lang="en-US" dirty="0"/>
+                    </a:p>
+                  </a:txBody>
+                  <a:tcPr/>
+                </a:tc>
+                <a:tc>
+                  <a:txBody>
+                    <a:bodyPr/>
+                    <a:lstStyle/>
+                    <a:p>
+                      <a:r>
+                        <a:rPr lang="en-US" dirty="0"/>
+                        <a:t>string</a:t>
+                      </a:r>
+                    </a:p>
+                  </a:txBody>
+                  <a:tcPr/>
+                </a:tc>
+                <a:tc>
+                  <a:txBody>
+                    <a:bodyPr/>
+                    <a:lstStyle/>
+                    <a:p>
+                      <a:r>
+                        <a:rPr lang="en-US" dirty="0"/>
+                        <a:t>stoichiometry</a:t>
+                      </a:r>
+                    </a:p>
+                  </a:txBody>
+                  <a:tcPr/>
+                </a:tc>
+                <a:tc>
+                  <a:txBody>
+                    <a:bodyPr/>
+                    <a:lstStyle/>
+                    <a:p>
+                      <a:pPr marL="0" marR="0" indent="0" algn="l" defTabSz="457200" rtl="0" eaLnBrk="1" fontAlgn="auto" latinLnBrk="0" hangingPunct="1">
+                        <a:lnSpc>
+                          <a:spcPct val="100000"/>
+                        </a:lnSpc>
+                        <a:spcBef>
+                          <a:spcPts val="0"/>
+                        </a:spcBef>
+                        <a:spcAft>
+                          <a:spcPts val="0"/>
+                        </a:spcAft>
+                        <a:buClrTx/>
+                        <a:buSzTx/>
+                        <a:buFontTx/>
+                        <a:buNone/>
+                        <a:tabLst/>
+                        <a:defRPr/>
+                      </a:pPr>
+                      <a:r>
+                        <a:rPr lang="en-US" sz="1800" kern="1200" dirty="0">
+                          <a:solidFill>
+                            <a:schemeClr val="dk1"/>
+                          </a:solidFill>
+                          <a:effectLst/>
+                          <a:latin typeface="+mn-lt"/>
+                          <a:ea typeface="+mn-ea"/>
+                          <a:cs typeface="+mn-cs"/>
+                        </a:rPr>
+                        <a:t>C18H9N3OSSe</a:t>
+                      </a:r>
+                    </a:p>
+                  </a:txBody>
+                  <a:tcPr/>
+                </a:tc>
+                <a:extLst>
+                  <a:ext uri="{0D108BD9-81ED-4DB2-BD59-A6C34878D82A}">
+                    <a16:rowId xmlns:a16="http://schemas.microsoft.com/office/drawing/2014/main" val="10003"/>
+                  </a:ext>
+                </a:extLst>
+              </a:tr>
+              <a:tr h="370840">
+                <a:tc>
+                  <a:txBody>
+                    <a:bodyPr/>
+                    <a:lstStyle/>
+                    <a:p>
+                      <a:r>
+                        <a:rPr lang="en-US" dirty="0"/>
+                        <a:t>mass</a:t>
+                      </a:r>
+                    </a:p>
+                  </a:txBody>
+                  <a:tcPr/>
+                </a:tc>
+                <a:tc>
+                  <a:txBody>
+                    <a:bodyPr/>
+                    <a:lstStyle/>
+                    <a:p>
+                      <a:r>
+                        <a:rPr lang="en-US" dirty="0"/>
+                        <a:t>float</a:t>
+                      </a:r>
+                    </a:p>
+                  </a:txBody>
+                  <a:tcPr/>
+                </a:tc>
+                <a:tc>
+                  <a:txBody>
+                    <a:bodyPr/>
+                    <a:lstStyle/>
+                    <a:p>
+                      <a:r>
+                        <a:rPr lang="en-US" dirty="0"/>
+                        <a:t>AMU</a:t>
+                      </a:r>
+                    </a:p>
+                  </a:txBody>
+                  <a:tcPr/>
+                </a:tc>
+                <a:tc>
+                  <a:txBody>
+                    <a:bodyPr/>
+                    <a:lstStyle/>
+                    <a:p>
+                      <a:pPr marL="0" marR="0" indent="0" algn="l" defTabSz="457200" rtl="0" eaLnBrk="1" fontAlgn="auto" latinLnBrk="0" hangingPunct="1">
+                        <a:lnSpc>
+                          <a:spcPct val="100000"/>
+                        </a:lnSpc>
+                        <a:spcBef>
+                          <a:spcPts val="0"/>
+                        </a:spcBef>
+                        <a:spcAft>
+                          <a:spcPts val="0"/>
+                        </a:spcAft>
+                        <a:buClrTx/>
+                        <a:buSzTx/>
+                        <a:buFontTx/>
+                        <a:buNone/>
+                        <a:tabLst/>
+                        <a:defRPr/>
+                      </a:pPr>
+                      <a:r>
+                        <a:rPr lang="hr-HR" sz="1800" kern="1200" dirty="0">
+                          <a:solidFill>
+                            <a:schemeClr val="dk1"/>
+                          </a:solidFill>
+                          <a:effectLst/>
+                          <a:latin typeface="+mn-lt"/>
+                          <a:ea typeface="+mn-ea"/>
+                          <a:cs typeface="+mn-cs"/>
+                        </a:rPr>
+                        <a:t>394.3151</a:t>
+                      </a:r>
+                    </a:p>
+                  </a:txBody>
+                  <a:tcPr/>
+                </a:tc>
+                <a:extLst>
+                  <a:ext uri="{0D108BD9-81ED-4DB2-BD59-A6C34878D82A}">
+                    <a16:rowId xmlns:a16="http://schemas.microsoft.com/office/drawing/2014/main" val="10004"/>
+                  </a:ext>
+                </a:extLst>
+              </a:tr>
+              <a:tr h="370840">
+                <a:tc>
+                  <a:txBody>
+                    <a:bodyPr/>
+                    <a:lstStyle/>
+                    <a:p>
+                      <a:r>
+                        <a:rPr lang="en-US" dirty="0" err="1"/>
+                        <a:t>pce</a:t>
+                      </a:r>
+                      <a:endParaRPr lang="en-US" dirty="0"/>
+                    </a:p>
+                  </a:txBody>
+                  <a:tcPr/>
+                </a:tc>
+                <a:tc>
+                  <a:txBody>
+                    <a:bodyPr/>
+                    <a:lstStyle/>
+                    <a:p>
+                      <a:r>
+                        <a:rPr lang="en-US" dirty="0"/>
+                        <a:t>float</a:t>
+                      </a:r>
+                    </a:p>
+                  </a:txBody>
+                  <a:tcPr/>
+                </a:tc>
+                <a:tc>
+                  <a:txBody>
+                    <a:bodyPr/>
+                    <a:lstStyle/>
+                    <a:p>
+                      <a:r>
+                        <a:rPr lang="en-US" dirty="0"/>
+                        <a:t>power conv. </a:t>
+                      </a:r>
+                      <a:r>
+                        <a:rPr lang="en-US" dirty="0" err="1"/>
+                        <a:t>effec</a:t>
+                      </a:r>
+                      <a:r>
+                        <a:rPr lang="en-US" dirty="0"/>
+                        <a:t>.</a:t>
+                      </a:r>
+                    </a:p>
+                  </a:txBody>
+                  <a:tcPr/>
+                </a:tc>
+                <a:tc>
+                  <a:txBody>
+                    <a:bodyPr/>
+                    <a:lstStyle/>
+                    <a:p>
+                      <a:pPr marL="0" marR="0" indent="0" algn="l" defTabSz="457200" rtl="0" eaLnBrk="1" fontAlgn="auto" latinLnBrk="0" hangingPunct="1">
+                        <a:lnSpc>
+                          <a:spcPct val="100000"/>
+                        </a:lnSpc>
+                        <a:spcBef>
+                          <a:spcPts val="0"/>
+                        </a:spcBef>
+                        <a:spcAft>
+                          <a:spcPts val="0"/>
+                        </a:spcAft>
+                        <a:buClrTx/>
+                        <a:buSzTx/>
+                        <a:buFontTx/>
+                        <a:buNone/>
+                        <a:tabLst/>
+                        <a:defRPr/>
+                      </a:pPr>
+                      <a:r>
+                        <a:rPr lang="nb-NO" sz="1800" kern="1200" dirty="0">
+                          <a:solidFill>
+                            <a:schemeClr val="dk1"/>
+                          </a:solidFill>
+                          <a:effectLst/>
+                          <a:latin typeface="+mn-lt"/>
+                          <a:ea typeface="+mn-ea"/>
+                          <a:cs typeface="+mn-cs"/>
+                        </a:rPr>
+                        <a:t>5.16195320211971</a:t>
+                      </a:r>
+                    </a:p>
+                  </a:txBody>
+                  <a:tcPr/>
+                </a:tc>
+                <a:extLst>
+                  <a:ext uri="{0D108BD9-81ED-4DB2-BD59-A6C34878D82A}">
+                    <a16:rowId xmlns:a16="http://schemas.microsoft.com/office/drawing/2014/main" val="10005"/>
+                  </a:ext>
+                </a:extLst>
+              </a:tr>
+              <a:tr h="370840">
+                <a:tc>
+                  <a:txBody>
+                    <a:bodyPr/>
+                    <a:lstStyle/>
+                    <a:p>
+                      <a:r>
+                        <a:rPr lang="en-US" dirty="0" err="1"/>
+                        <a:t>voc</a:t>
+                      </a:r>
+                      <a:endParaRPr lang="en-US" dirty="0"/>
+                    </a:p>
+                  </a:txBody>
+                  <a:tcPr/>
+                </a:tc>
+                <a:tc>
+                  <a:txBody>
+                    <a:bodyPr/>
+                    <a:lstStyle/>
+                    <a:p>
+                      <a:r>
+                        <a:rPr lang="en-US" dirty="0"/>
+                        <a:t>float</a:t>
+                      </a:r>
+                    </a:p>
+                  </a:txBody>
+                  <a:tcPr/>
+                </a:tc>
+                <a:tc>
+                  <a:txBody>
+                    <a:bodyPr/>
+                    <a:lstStyle/>
+                    <a:p>
+                      <a:r>
+                        <a:rPr lang="en-US" dirty="0"/>
+                        <a:t>open circ.</a:t>
+                      </a:r>
+                      <a:r>
+                        <a:rPr lang="en-US" baseline="0" dirty="0"/>
+                        <a:t> voltage</a:t>
+                      </a:r>
+                      <a:endParaRPr lang="en-US" dirty="0"/>
+                    </a:p>
+                  </a:txBody>
+                  <a:tcPr/>
+                </a:tc>
+                <a:tc>
+                  <a:txBody>
+                    <a:bodyPr/>
+                    <a:lstStyle/>
+                    <a:p>
+                      <a:pPr marL="0" marR="0" indent="0" algn="l" defTabSz="457200" rtl="0" eaLnBrk="1" fontAlgn="auto" latinLnBrk="0" hangingPunct="1">
+                        <a:lnSpc>
+                          <a:spcPct val="100000"/>
+                        </a:lnSpc>
+                        <a:spcBef>
+                          <a:spcPts val="0"/>
+                        </a:spcBef>
+                        <a:spcAft>
+                          <a:spcPts val="0"/>
+                        </a:spcAft>
+                        <a:buClrTx/>
+                        <a:buSzTx/>
+                        <a:buFontTx/>
+                        <a:buNone/>
+                        <a:tabLst/>
+                        <a:defRPr/>
+                      </a:pPr>
+                      <a:r>
+                        <a:rPr lang="is-IS" sz="1800" kern="1200" dirty="0">
+                          <a:solidFill>
+                            <a:schemeClr val="dk1"/>
+                          </a:solidFill>
+                          <a:effectLst/>
+                          <a:latin typeface="+mn-lt"/>
+                          <a:ea typeface="+mn-ea"/>
+                          <a:cs typeface="+mn-cs"/>
+                        </a:rPr>
+                        <a:t>0.86760078740294</a:t>
+                      </a:r>
+                    </a:p>
+                  </a:txBody>
+                  <a:tcPr/>
+                </a:tc>
+                <a:extLst>
+                  <a:ext uri="{0D108BD9-81ED-4DB2-BD59-A6C34878D82A}">
+                    <a16:rowId xmlns:a16="http://schemas.microsoft.com/office/drawing/2014/main" val="10006"/>
+                  </a:ext>
+                </a:extLst>
+              </a:tr>
+              <a:tr h="370840">
+                <a:tc>
+                  <a:txBody>
+                    <a:bodyPr/>
+                    <a:lstStyle/>
+                    <a:p>
+                      <a:r>
+                        <a:rPr lang="en-US" dirty="0" err="1"/>
+                        <a:t>jsc</a:t>
+                      </a:r>
+                      <a:endParaRPr lang="en-US" dirty="0"/>
+                    </a:p>
+                  </a:txBody>
+                  <a:tcPr/>
+                </a:tc>
+                <a:tc>
+                  <a:txBody>
+                    <a:bodyPr/>
+                    <a:lstStyle/>
+                    <a:p>
+                      <a:r>
+                        <a:rPr lang="en-US" dirty="0"/>
+                        <a:t>float</a:t>
+                      </a:r>
+                    </a:p>
+                  </a:txBody>
+                  <a:tcPr/>
+                </a:tc>
+                <a:tc>
+                  <a:txBody>
+                    <a:bodyPr/>
+                    <a:lstStyle/>
+                    <a:p>
+                      <a:r>
+                        <a:rPr lang="en-US" dirty="0"/>
+                        <a:t>short circ. density</a:t>
+                      </a:r>
+                    </a:p>
+                  </a:txBody>
+                  <a:tcPr/>
+                </a:tc>
+                <a:tc>
+                  <a:txBody>
+                    <a:bodyPr/>
+                    <a:lstStyle/>
+                    <a:p>
+                      <a:pPr marL="0" marR="0" indent="0" algn="l" defTabSz="457200" rtl="0" eaLnBrk="1" fontAlgn="auto" latinLnBrk="0" hangingPunct="1">
+                        <a:lnSpc>
+                          <a:spcPct val="100000"/>
+                        </a:lnSpc>
+                        <a:spcBef>
+                          <a:spcPts val="0"/>
+                        </a:spcBef>
+                        <a:spcAft>
+                          <a:spcPts val="0"/>
+                        </a:spcAft>
+                        <a:buClrTx/>
+                        <a:buSzTx/>
+                        <a:buFontTx/>
+                        <a:buNone/>
+                        <a:tabLst/>
+                        <a:defRPr/>
+                      </a:pPr>
+                      <a:r>
+                        <a:rPr lang="nb-NO" sz="1800" kern="1200" dirty="0">
+                          <a:solidFill>
+                            <a:schemeClr val="dk1"/>
+                          </a:solidFill>
+                          <a:effectLst/>
+                          <a:latin typeface="+mn-lt"/>
+                          <a:ea typeface="+mn-ea"/>
+                          <a:cs typeface="+mn-cs"/>
+                        </a:rPr>
+                        <a:t>91.5675749599</a:t>
+                      </a:r>
+                    </a:p>
+                  </a:txBody>
+                  <a:tcPr/>
+                </a:tc>
+                <a:extLst>
+                  <a:ext uri="{0D108BD9-81ED-4DB2-BD59-A6C34878D82A}">
+                    <a16:rowId xmlns:a16="http://schemas.microsoft.com/office/drawing/2014/main" val="10007"/>
+                  </a:ext>
+                </a:extLst>
+              </a:tr>
+              <a:tr h="370840">
+                <a:tc>
+                  <a:txBody>
+                    <a:bodyPr/>
+                    <a:lstStyle/>
+                    <a:p>
+                      <a:r>
+                        <a:rPr lang="en-US" dirty="0" err="1"/>
+                        <a:t>e_homo_alpha</a:t>
+                      </a:r>
+                      <a:endParaRPr lang="en-US" dirty="0"/>
+                    </a:p>
+                  </a:txBody>
+                  <a:tcPr/>
+                </a:tc>
+                <a:tc>
+                  <a:txBody>
+                    <a:bodyPr/>
+                    <a:lstStyle/>
+                    <a:p>
+                      <a:r>
+                        <a:rPr lang="en-US" dirty="0"/>
+                        <a:t>float</a:t>
+                      </a:r>
+                    </a:p>
+                  </a:txBody>
+                  <a:tcPr/>
+                </a:tc>
+                <a:tc>
+                  <a:txBody>
+                    <a:bodyPr/>
+                    <a:lstStyle/>
+                    <a:p>
+                      <a:r>
+                        <a:rPr lang="en-US" dirty="0"/>
+                        <a:t>high occ.</a:t>
+                      </a:r>
+                      <a:r>
+                        <a:rPr lang="en-US" baseline="0" dirty="0"/>
+                        <a:t> mol. orb.</a:t>
+                      </a:r>
+                      <a:endParaRPr lang="en-US" dirty="0"/>
+                    </a:p>
+                  </a:txBody>
+                  <a:tcPr/>
+                </a:tc>
+                <a:tc>
+                  <a:txBody>
+                    <a:bodyPr/>
+                    <a:lstStyle/>
+                    <a:p>
+                      <a:pPr marL="0" marR="0" indent="0" algn="l" defTabSz="457200" rtl="0" eaLnBrk="1" fontAlgn="auto" latinLnBrk="0" hangingPunct="1">
+                        <a:lnSpc>
+                          <a:spcPct val="100000"/>
+                        </a:lnSpc>
+                        <a:spcBef>
+                          <a:spcPts val="0"/>
+                        </a:spcBef>
+                        <a:spcAft>
+                          <a:spcPts val="0"/>
+                        </a:spcAft>
+                        <a:buClrTx/>
+                        <a:buSzTx/>
+                        <a:buFontTx/>
+                        <a:buNone/>
+                        <a:tabLst/>
+                        <a:defRPr/>
+                      </a:pPr>
+                      <a:r>
+                        <a:rPr lang="is-IS" sz="1800" kern="1200" dirty="0">
+                          <a:solidFill>
+                            <a:schemeClr val="dk1"/>
+                          </a:solidFill>
+                          <a:effectLst/>
+                          <a:latin typeface="+mn-lt"/>
+                          <a:ea typeface="+mn-ea"/>
+                          <a:cs typeface="+mn-cs"/>
+                        </a:rPr>
+                        <a:t>-5.46760078740294</a:t>
+                      </a:r>
+                    </a:p>
+                  </a:txBody>
+                  <a:tcPr/>
+                </a:tc>
+                <a:extLst>
+                  <a:ext uri="{0D108BD9-81ED-4DB2-BD59-A6C34878D82A}">
+                    <a16:rowId xmlns:a16="http://schemas.microsoft.com/office/drawing/2014/main" val="10008"/>
+                  </a:ext>
+                </a:extLst>
+              </a:tr>
+              <a:tr h="370840">
+                <a:tc>
+                  <a:txBody>
+                    <a:bodyPr/>
+                    <a:lstStyle/>
+                    <a:p>
+                      <a:r>
+                        <a:rPr lang="en-US" dirty="0" err="1"/>
+                        <a:t>e_gap_alpha</a:t>
+                      </a:r>
+                      <a:endParaRPr lang="en-US" dirty="0"/>
+                    </a:p>
+                  </a:txBody>
+                  <a:tcPr/>
+                </a:tc>
+                <a:tc>
+                  <a:txBody>
+                    <a:bodyPr/>
+                    <a:lstStyle/>
+                    <a:p>
+                      <a:r>
+                        <a:rPr lang="en-US" dirty="0"/>
+                        <a:t>float</a:t>
+                      </a:r>
+                    </a:p>
+                  </a:txBody>
+                  <a:tcPr/>
+                </a:tc>
+                <a:tc>
+                  <a:txBody>
+                    <a:bodyPr/>
+                    <a:lstStyle/>
+                    <a:p>
+                      <a:r>
+                        <a:rPr lang="en-US" dirty="0"/>
+                        <a:t>LUMO-HOMO</a:t>
+                      </a:r>
+                    </a:p>
+                  </a:txBody>
+                  <a:tcPr/>
+                </a:tc>
+                <a:tc>
+                  <a:txBody>
+                    <a:bodyPr/>
+                    <a:lstStyle/>
+                    <a:p>
+                      <a:pPr marL="0" marR="0" indent="0" algn="l" defTabSz="457200" rtl="0" eaLnBrk="1" fontAlgn="auto" latinLnBrk="0" hangingPunct="1">
+                        <a:lnSpc>
+                          <a:spcPct val="100000"/>
+                        </a:lnSpc>
+                        <a:spcBef>
+                          <a:spcPts val="0"/>
+                        </a:spcBef>
+                        <a:spcAft>
+                          <a:spcPts val="0"/>
+                        </a:spcAft>
+                        <a:buClrTx/>
+                        <a:buSzTx/>
+                        <a:buFontTx/>
+                        <a:buNone/>
+                        <a:tabLst/>
+                        <a:defRPr/>
+                      </a:pPr>
+                      <a:r>
+                        <a:rPr lang="is-IS" sz="1800" kern="1200" dirty="0">
+                          <a:solidFill>
+                            <a:schemeClr val="dk1"/>
+                          </a:solidFill>
+                          <a:effectLst/>
+                          <a:latin typeface="+mn-lt"/>
+                          <a:ea typeface="+mn-ea"/>
+                          <a:cs typeface="+mn-cs"/>
+                        </a:rPr>
+                        <a:t>2.02294443593306</a:t>
+                      </a:r>
+                    </a:p>
+                  </a:txBody>
+                  <a:tcPr/>
+                </a:tc>
+                <a:extLst>
+                  <a:ext uri="{0D108BD9-81ED-4DB2-BD59-A6C34878D82A}">
+                    <a16:rowId xmlns:a16="http://schemas.microsoft.com/office/drawing/2014/main" val="10009"/>
+                  </a:ext>
+                </a:extLst>
+              </a:tr>
+              <a:tr h="370840">
+                <a:tc>
+                  <a:txBody>
+                    <a:bodyPr/>
+                    <a:lstStyle/>
+                    <a:p>
+                      <a:r>
+                        <a:rPr lang="en-US" dirty="0" err="1"/>
+                        <a:t>e_lumo_alpha</a:t>
+                      </a:r>
+                      <a:endParaRPr lang="en-US" dirty="0"/>
+                    </a:p>
+                  </a:txBody>
+                  <a:tcPr/>
+                </a:tc>
+                <a:tc>
+                  <a:txBody>
+                    <a:bodyPr/>
+                    <a:lstStyle/>
+                    <a:p>
+                      <a:r>
+                        <a:rPr lang="en-US" dirty="0"/>
+                        <a:t>float</a:t>
+                      </a:r>
+                    </a:p>
+                  </a:txBody>
+                  <a:tcPr/>
+                </a:tc>
+                <a:tc>
+                  <a:txBody>
+                    <a:bodyPr/>
+                    <a:lstStyle/>
+                    <a:p>
+                      <a:pPr marL="0" marR="0" indent="0" algn="l" defTabSz="457200" rtl="0" eaLnBrk="1" fontAlgn="auto" latinLnBrk="0" hangingPunct="1">
+                        <a:lnSpc>
+                          <a:spcPct val="100000"/>
+                        </a:lnSpc>
+                        <a:spcBef>
+                          <a:spcPts val="0"/>
+                        </a:spcBef>
+                        <a:spcAft>
+                          <a:spcPts val="0"/>
+                        </a:spcAft>
+                        <a:buClrTx/>
+                        <a:buSzTx/>
+                        <a:buFontTx/>
+                        <a:buNone/>
+                        <a:tabLst/>
+                        <a:defRPr/>
+                      </a:pPr>
+                      <a:r>
+                        <a:rPr lang="en-US" dirty="0"/>
+                        <a:t>low occ. mol.</a:t>
+                      </a:r>
+                      <a:r>
+                        <a:rPr lang="en-US" baseline="0" dirty="0"/>
+                        <a:t> orb.</a:t>
+                      </a:r>
+                      <a:endParaRPr lang="en-US" dirty="0"/>
+                    </a:p>
+                  </a:txBody>
+                  <a:tcPr/>
+                </a:tc>
+                <a:tc>
+                  <a:txBody>
+                    <a:bodyPr/>
+                    <a:lstStyle/>
+                    <a:p>
+                      <a:pPr marL="0" marR="0" indent="0" algn="l" defTabSz="457200" rtl="0" eaLnBrk="1" fontAlgn="auto" latinLnBrk="0" hangingPunct="1">
+                        <a:lnSpc>
+                          <a:spcPct val="100000"/>
+                        </a:lnSpc>
+                        <a:spcBef>
+                          <a:spcPts val="0"/>
+                        </a:spcBef>
+                        <a:spcAft>
+                          <a:spcPts val="0"/>
+                        </a:spcAft>
+                        <a:buClrTx/>
+                        <a:buSzTx/>
+                        <a:buFontTx/>
+                        <a:buNone/>
+                        <a:tabLst/>
+                        <a:defRPr/>
+                      </a:pPr>
+                      <a:r>
+                        <a:rPr lang="mr-IN" sz="1600" kern="1200" dirty="0">
+                          <a:solidFill>
+                            <a:schemeClr val="dk1"/>
+                          </a:solidFill>
+                          <a:effectLst/>
+                          <a:latin typeface="+mn-lt"/>
+                          <a:ea typeface="+mn-ea"/>
+                          <a:cs typeface="+mn-cs"/>
+                        </a:rPr>
+                        <a:t>-3.444656351469</a:t>
+                      </a:r>
+                    </a:p>
+                  </a:txBody>
+                  <a:tcPr/>
+                </a:tc>
+                <a:extLst>
+                  <a:ext uri="{0D108BD9-81ED-4DB2-BD59-A6C34878D82A}">
+                    <a16:rowId xmlns:a16="http://schemas.microsoft.com/office/drawing/2014/main" val="10010"/>
+                  </a:ext>
+                </a:extLst>
+              </a:tr>
+              <a:tr h="370840">
+                <a:tc>
+                  <a:txBody>
+                    <a:bodyPr/>
+                    <a:lstStyle/>
+                    <a:p>
+                      <a:r>
+                        <a:rPr lang="en-US" dirty="0" err="1"/>
+                        <a:t>tmp_smiles_str</a:t>
+                      </a:r>
+                      <a:endParaRPr lang="en-US" dirty="0"/>
+                    </a:p>
+                  </a:txBody>
+                  <a:tcPr/>
+                </a:tc>
+                <a:tc>
+                  <a:txBody>
+                    <a:bodyPr/>
+                    <a:lstStyle/>
+                    <a:p>
+                      <a:r>
+                        <a:rPr lang="en-US" dirty="0"/>
+                        <a:t>string</a:t>
+                      </a:r>
+                    </a:p>
+                  </a:txBody>
+                  <a:tcPr/>
+                </a:tc>
+                <a:tc>
+                  <a:txBody>
+                    <a:bodyPr/>
+                    <a:lstStyle/>
+                    <a:p>
+                      <a:r>
+                        <a:rPr lang="en-US" dirty="0"/>
+                        <a:t>SMILES</a:t>
+                      </a:r>
+                    </a:p>
+                  </a:txBody>
+                  <a:tcPr/>
+                </a:tc>
+                <a:tc>
+                  <a:txBody>
+                    <a:bodyPr/>
+                    <a:lstStyle/>
+                    <a:p>
+                      <a:r>
+                        <a:rPr lang="en-US" sz="1800" kern="1200" dirty="0">
+                          <a:solidFill>
+                            <a:schemeClr val="dk1"/>
+                          </a:solidFill>
+                          <a:effectLst/>
+                          <a:latin typeface="+mn-lt"/>
+                          <a:ea typeface="+mn-ea"/>
+                          <a:cs typeface="+mn-cs"/>
+                        </a:rPr>
+                        <a:t>C1C=CC=C1c1cc2</a:t>
+                      </a:r>
+                      <a:endParaRPr lang="en-US" dirty="0"/>
+                    </a:p>
+                  </a:txBody>
+                  <a:tcPr/>
+                </a:tc>
+                <a:extLst>
+                  <a:ext uri="{0D108BD9-81ED-4DB2-BD59-A6C34878D82A}">
+                    <a16:rowId xmlns:a16="http://schemas.microsoft.com/office/drawing/2014/main" val="10011"/>
+                  </a:ext>
+                </a:extLst>
+              </a:tr>
+            </a:tbl>
+          </a:graphicData>
+        </a:graphic>
+      </p:graphicFrame>
+      <p:sp>
+        <p:nvSpPr>
+          <p:cNvPr id="5" name="TextBox 4"/>
+          <p:cNvSpPr txBox="1"/>
+          <p:nvPr/>
+        </p:nvSpPr>
+        <p:spPr>
+          <a:xfrm>
+            <a:off x="457200" y="1719384"/>
+            <a:ext cx="8444299" cy="369332"/>
+          </a:xfrm>
+          <a:prstGeom prst="rect">
+            <a:avLst/>
+          </a:prstGeom>
+          <a:noFill/>
+        </p:spPr>
+        <p:txBody>
+          <a:bodyPr wrap="none" rtlCol="0">
+            <a:spAutoFit/>
+          </a:bodyPr>
+          <a:lstStyle/>
+          <a:p>
+            <a:r>
+              <a:rPr lang="en-US" dirty="0"/>
+              <a:t>Harvard Clean Energy Project: </a:t>
+            </a:r>
+            <a:r>
+              <a:rPr lang="en-US" dirty="0">
+                <a:hlinkClick r:id="rId4"/>
+              </a:rPr>
+              <a:t>http://faculty.washington.edu/dacb/HCEPDB_moldata.zip</a:t>
+            </a:r>
+            <a:endParaRPr lang="en-US" dirty="0"/>
+          </a:p>
+        </p:txBody>
+      </p:sp>
+      <p:sp>
+        <p:nvSpPr>
+          <p:cNvPr id="6" name="TextBox 5"/>
+          <p:cNvSpPr txBox="1"/>
+          <p:nvPr/>
+        </p:nvSpPr>
+        <p:spPr>
+          <a:xfrm>
+            <a:off x="369518" y="2088716"/>
+            <a:ext cx="8404964" cy="2862322"/>
+          </a:xfrm>
+          <a:prstGeom prst="rect">
+            <a:avLst/>
+          </a:prstGeom>
+          <a:solidFill>
+            <a:schemeClr val="bg1"/>
+          </a:solidFill>
+        </p:spPr>
+        <p:txBody>
+          <a:bodyPr wrap="square" rtlCol="0">
+            <a:spAutoFit/>
+          </a:bodyPr>
+          <a:lstStyle/>
+          <a:p>
+            <a:r>
+              <a:rPr lang="en-US" sz="3600" b="1" dirty="0">
+                <a:solidFill>
+                  <a:srgbClr val="FF0000"/>
+                </a:solidFill>
+              </a:rPr>
+              <a:t>DO NOT REDISTRIBUTE!</a:t>
+            </a:r>
+          </a:p>
+          <a:p>
+            <a:endParaRPr lang="en-US" sz="3600" b="1" dirty="0">
+              <a:solidFill>
+                <a:srgbClr val="FF0000"/>
+              </a:solidFill>
+            </a:endParaRPr>
+          </a:p>
+          <a:p>
+            <a:r>
+              <a:rPr lang="en-US" sz="3600" b="1" dirty="0">
+                <a:solidFill>
+                  <a:srgbClr val="FF0000"/>
+                </a:solidFill>
+              </a:rPr>
+              <a:t>DO NOT USE THIS DATA IN YOUR RESEARCH WITHOUT CREDITING </a:t>
+            </a:r>
+          </a:p>
+          <a:p>
+            <a:pPr algn="ctr"/>
+            <a:r>
+              <a:rPr lang="en-US" sz="3600" b="1" dirty="0">
+                <a:solidFill>
+                  <a:srgbClr val="FF0000"/>
+                </a:solidFill>
+              </a:rPr>
+              <a:t>HARVARD CLEAN ENERGY POJECT</a:t>
+            </a:r>
+          </a:p>
+        </p:txBody>
+      </p:sp>
+    </p:spTree>
+    <p:extLst>
+      <p:ext uri="{BB962C8B-B14F-4D97-AF65-F5344CB8AC3E}">
+        <p14:creationId xmlns:p14="http://schemas.microsoft.com/office/powerpoint/2010/main" val="2329097868"/>
+      </p:ext>
+    </p:extLst>
+  </p:cSld>
+  <p:clrMapOvr>
+    <a:masterClrMapping/>
+  </p:clrMapOvr>
+  <p:timing>
+    <p:tnLst>
+      <p:par>
+        <p:cTn id="1" dur="indefinite" restart="never" nodeType="tmRoot">
+          <p:childTnLst>
+            <p:seq concurrent="1" nextAc="seek">
+              <p:cTn id="2" dur="indefinite" nodeType="mainSeq">
+                <p:childTnLst>
+                  <p:par>
+                    <p:cTn id="3" fill="hold">
+                      <p:stCondLst>
+                        <p:cond delay="indefinite"/>
+                      </p:stCondLst>
+                      <p:childTnLst>
+                        <p:par>
+                          <p:cTn id="4" fill="hold">
+                            <p:stCondLst>
+                              <p:cond delay="0"/>
+                            </p:stCondLst>
+                            <p:childTnLst>
+                              <p:par>
+                                <p:cTn id="5" presetID="1" presetClass="entr" presetSubtype="0" fill="hold" grpId="0" nodeType="clickEffect">
+                                  <p:stCondLst>
+                                    <p:cond delay="0"/>
+                                  </p:stCondLst>
+                                  <p:childTnLst>
+                                    <p:set>
+                                      <p:cBhvr>
+                                        <p:cTn id="6" dur="1" fill="hold">
+                                          <p:stCondLst>
+                                            <p:cond delay="0"/>
+                                          </p:stCondLst>
+                                        </p:cTn>
+                                        <p:tgtEl>
+                                          <p:spTgt spid="6"/>
+                                        </p:tgtEl>
+                                        <p:attrNameLst>
+                                          <p:attrName>style.visibility</p:attrName>
+                                        </p:attrNameLst>
+                                      </p:cBhvr>
+                                      <p:to>
+                                        <p:strVal val="visible"/>
+                                      </p:to>
+                                    </p:set>
+                                  </p:childTnLst>
+                                </p:cTn>
+                              </p:par>
+                            </p:childTnLst>
+                          </p:cTn>
+                        </p:par>
+                      </p:childTnLst>
+                    </p:cTn>
+                  </p:par>
+                </p:childTnLst>
+              </p:cTn>
+              <p:prevCondLst>
+                <p:cond evt="onPrev" delay="0">
+                  <p:tgtEl>
+                    <p:sldTgt/>
+                  </p:tgtEl>
+                </p:cond>
+              </p:prevCondLst>
+              <p:nextCondLst>
+                <p:cond evt="onNext" delay="0">
+                  <p:tgtEl>
+                    <p:sldTgt/>
+                  </p:tgtEl>
+                </p:cond>
+              </p:nextCondLst>
+            </p:seq>
+          </p:childTnLst>
+        </p:cTn>
+      </p:par>
+    </p:tnLst>
+    <p:bldLst>
+      <p:bldP spid="6" grpId="0" animBg="1"/>
+    </p:bldLst>
+  </p:timing>
+</p:sld>
+</file>
+
+<file path=ppt/slides/slide3.xml><?xml version="1.0" encoding="utf-8"?>
+<p:sld xmlns:a="http://schemas.openxmlformats.org/drawingml/2006/main" xmlns:r="http://schemas.openxmlformats.org/officeDocument/2006/relationships" xmlns:p="http://schemas.openxmlformats.org/presentationml/2006/main">
+  <p:cSld>
+    <p:spTree>
+      <p:nvGrpSpPr>
+        <p:cNvPr id="1" name=""/>
+        <p:cNvGrpSpPr/>
+        <p:nvPr/>
+      </p:nvGrpSpPr>
+      <p:grpSpPr>
+        <a:xfrm>
+          <a:off x="0" y="0"/>
+          <a:ext cx="0" cy="0"/>
+          <a:chOff x="0" y="0"/>
+          <a:chExt cx="0" cy="0"/>
+        </a:xfrm>
+      </p:grpSpPr>
+      <p:sp>
+        <p:nvSpPr>
+          <p:cNvPr id="2" name="Title 1"/>
+          <p:cNvSpPr>
+            <a:spLocks noGrp="1"/>
+          </p:cNvSpPr>
+          <p:nvPr>
+            <p:ph type="title"/>
+          </p:nvPr>
+        </p:nvSpPr>
+        <p:spPr/>
+        <p:txBody>
+          <a:bodyPr>
+            <a:normAutofit/>
+          </a:bodyPr>
+          <a:lstStyle/>
+          <a:p>
+            <a:r>
+              <a:rPr lang="en-US" dirty="0"/>
+              <a:t>Data schema</a:t>
+            </a:r>
+          </a:p>
+        </p:txBody>
+      </p:sp>
+      <p:sp>
+        <p:nvSpPr>
+          <p:cNvPr id="4" name="Content Placeholder 3"/>
+          <p:cNvSpPr>
+            <a:spLocks noGrp="1"/>
+          </p:cNvSpPr>
+          <p:nvPr>
+            <p:ph idx="1"/>
+          </p:nvPr>
+        </p:nvSpPr>
+        <p:spPr/>
+        <p:txBody>
+          <a:bodyPr>
+            <a:normAutofit/>
+          </a:bodyPr>
+          <a:lstStyle/>
+          <a:p>
+            <a:r>
+              <a:rPr lang="en-US" dirty="0"/>
+              <a:t>“metadata” or schema</a:t>
+            </a:r>
+          </a:p>
+          <a:p>
+            <a:pPr lvl="1"/>
+            <a:r>
+              <a:rPr lang="en-US" dirty="0"/>
+              <a:t>Data types</a:t>
+            </a:r>
+          </a:p>
+          <a:p>
+            <a:pPr lvl="1"/>
+            <a:r>
+              <a:rPr lang="en-US" dirty="0"/>
+              <a:t>Units</a:t>
+            </a:r>
+          </a:p>
+          <a:p>
+            <a:pPr lvl="1"/>
+            <a:r>
+              <a:rPr lang="en-US" dirty="0"/>
+              <a:t>“keys” (unique identifiers for molecules)</a:t>
+            </a:r>
+          </a:p>
+        </p:txBody>
+      </p:sp>
+      <p:pic>
+        <p:nvPicPr>
+          <p:cNvPr id="5" name="Picture 4"/>
+          <p:cNvPicPr>
+            <a:picLocks noChangeAspect="1"/>
+          </p:cNvPicPr>
+          <p:nvPr/>
+        </p:nvPicPr>
+        <p:blipFill>
+          <a:blip r:embed="rId3"/>
+          <a:stretch>
+            <a:fillRect/>
+          </a:stretch>
+        </p:blipFill>
+        <p:spPr>
+          <a:xfrm>
+            <a:off x="2129164" y="3839857"/>
+            <a:ext cx="4847833" cy="2688276"/>
+          </a:xfrm>
+          <a:prstGeom prst="rect">
+            <a:avLst/>
+          </a:prstGeom>
+        </p:spPr>
+      </p:pic>
+    </p:spTree>
+    <p:extLst>
+      <p:ext uri="{BB962C8B-B14F-4D97-AF65-F5344CB8AC3E}">
+        <p14:creationId xmlns:p14="http://schemas.microsoft.com/office/powerpoint/2010/main" val="1252453370"/>
+      </p:ext>
+    </p:extLst>
+  </p:cSld>
+  <p:clrMapOvr>
+    <a:masterClrMapping/>
+  </p:clrMapOvr>
+</p:sld>
+</file>
+
+<file path=ppt/slides/slide4.xml><?xml version="1.0" encoding="utf-8"?>
 <p:sld xmlns:a="http://schemas.openxmlformats.org/drawingml/2006/main" xmlns:r="http://schemas.openxmlformats.org/officeDocument/2006/relationships" xmlns:p="http://schemas.openxmlformats.org/presentationml/2006/main">
   <p:cSld>
     <p:spTree>
@@ -8638,7 +10604,7 @@
 </p:sld>
 </file>
 
-<file path=ppt/slides/slide3.xml><?xml version="1.0" encoding="utf-8"?>
+<file path=ppt/slides/slide5.xml><?xml version="1.0" encoding="utf-8"?>
 <p:sld xmlns:a="http://schemas.openxmlformats.org/drawingml/2006/main" xmlns:r="http://schemas.openxmlformats.org/officeDocument/2006/relationships" xmlns:p="http://schemas.openxmlformats.org/presentationml/2006/main">
   <p:cSld>
     <p:spTree>
@@ -9058,7 +11024,7 @@
 </p:sld>
 </file>
 
-<file path=ppt/slides/slide4.xml><?xml version="1.0" encoding="utf-8"?>
+<file path=ppt/slides/slide6.xml><?xml version="1.0" encoding="utf-8"?>
 <p:sld xmlns:a="http://schemas.openxmlformats.org/drawingml/2006/main" xmlns:r="http://schemas.openxmlformats.org/officeDocument/2006/relationships" xmlns:p="http://schemas.openxmlformats.org/presentationml/2006/main">
   <p:cSld>
     <p:spTree>
@@ -9290,7 +11256,7 @@
 </p:sld>
 </file>
 
-<file path=ppt/slides/slide5.xml><?xml version="1.0" encoding="utf-8"?>
+<file path=ppt/slides/slide7.xml><?xml version="1.0" encoding="utf-8"?>
 <p:sld xmlns:a="http://schemas.openxmlformats.org/drawingml/2006/main" xmlns:r="http://schemas.openxmlformats.org/officeDocument/2006/relationships" xmlns:p="http://schemas.openxmlformats.org/presentationml/2006/main">
   <p:cSld>
     <p:spTree>
@@ -9491,7 +11457,7 @@
 </p:sld>
 </file>
 
-<file path=ppt/slides/slide6.xml><?xml version="1.0" encoding="utf-8"?>
+<file path=ppt/slides/slide8.xml><?xml version="1.0" encoding="utf-8"?>
 <p:sld xmlns:a="http://schemas.openxmlformats.org/drawingml/2006/main" xmlns:r="http://schemas.openxmlformats.org/officeDocument/2006/relationships" xmlns:p="http://schemas.openxmlformats.org/presentationml/2006/main">
   <p:cSld>
     <p:spTree>
@@ -9644,7 +11610,7 @@
 </p:sld>
 </file>
 
-<file path=ppt/slides/slide7.xml><?xml version="1.0" encoding="utf-8"?>
+<file path=ppt/slides/slide9.xml><?xml version="1.0" encoding="utf-8"?>
 <p:sld xmlns:a="http://schemas.openxmlformats.org/drawingml/2006/main" xmlns:r="http://schemas.openxmlformats.org/officeDocument/2006/relationships" xmlns:p="http://schemas.openxmlformats.org/presentationml/2006/main">
   <p:cSld>
     <p:spTree>
@@ -10126,369 +12092,6 @@
       </p:par>
     </p:tnLst>
   </p:timing>
-</p:sld>
-</file>
-
-<file path=ppt/slides/slide8.xml><?xml version="1.0" encoding="utf-8"?>
-<p:sld xmlns:a="http://schemas.openxmlformats.org/drawingml/2006/main" xmlns:r="http://schemas.openxmlformats.org/officeDocument/2006/relationships" xmlns:p="http://schemas.openxmlformats.org/presentationml/2006/main">
-  <p:cSld>
-    <p:spTree>
-      <p:nvGrpSpPr>
-        <p:cNvPr id="1" name=""/>
-        <p:cNvGrpSpPr/>
-        <p:nvPr/>
-      </p:nvGrpSpPr>
-      <p:grpSpPr>
-        <a:xfrm>
-          <a:off x="0" y="0"/>
-          <a:ext cx="0" cy="0"/>
-          <a:chOff x="0" y="0"/>
-          <a:chExt cx="0" cy="0"/>
-        </a:xfrm>
-      </p:grpSpPr>
-      <p:sp>
-        <p:nvSpPr>
-          <p:cNvPr id="2" name="Title 1"/>
-          <p:cNvSpPr>
-            <a:spLocks noGrp="1"/>
-          </p:cNvSpPr>
-          <p:nvPr>
-            <p:ph type="title"/>
-          </p:nvPr>
-        </p:nvSpPr>
-        <p:spPr/>
-        <p:txBody>
-          <a:bodyPr/>
-          <a:lstStyle/>
-          <a:p>
-            <a:r>
-              <a:rPr lang="en-US" dirty="0"/>
-              <a:t>Command line tips and tricks</a:t>
-            </a:r>
-          </a:p>
-        </p:txBody>
-      </p:sp>
-      <p:sp>
-        <p:nvSpPr>
-          <p:cNvPr id="3" name="Content Placeholder 2"/>
-          <p:cNvSpPr>
-            <a:spLocks noGrp="1"/>
-          </p:cNvSpPr>
-          <p:nvPr>
-            <p:ph idx="1"/>
-          </p:nvPr>
-        </p:nvSpPr>
-        <p:spPr/>
-        <p:txBody>
-          <a:bodyPr/>
-          <a:lstStyle/>
-          <a:p>
-            <a:r>
-              <a:rPr lang="en-US" dirty="0"/>
-              <a:t>Tab completion is your friend</a:t>
-            </a:r>
-          </a:p>
-          <a:p>
-            <a:pPr lvl="1"/>
-            <a:r>
-              <a:rPr lang="en-US" dirty="0"/>
-              <a:t>When entering a file arguments</a:t>
-            </a:r>
-          </a:p>
-          <a:p>
-            <a:pPr lvl="1"/>
-            <a:r>
-              <a:rPr lang="en-US" dirty="0"/>
-              <a:t>When entering directory </a:t>
-            </a:r>
-            <a:r>
-              <a:rPr lang="en-US" dirty="0" err="1"/>
-              <a:t>pathes</a:t>
-            </a:r>
-            <a:endParaRPr lang="en-US" dirty="0"/>
-          </a:p>
-          <a:p>
-            <a:pPr lvl="1"/>
-            <a:r>
-              <a:rPr lang="en-US" dirty="0"/>
-              <a:t>Hitting tab will autocomplete the filename!</a:t>
-            </a:r>
-          </a:p>
-          <a:p>
-            <a:pPr lvl="1"/>
-            <a:endParaRPr lang="en-US" dirty="0"/>
-          </a:p>
-          <a:p>
-            <a:pPr lvl="1"/>
-            <a:r>
-              <a:rPr lang="en-US" dirty="0"/>
-              <a:t>I will pester you about this</a:t>
-            </a:r>
-          </a:p>
-        </p:txBody>
-      </p:sp>
-      <p:pic>
-        <p:nvPicPr>
-          <p:cNvPr id="4" name="Picture 3"/>
-          <p:cNvPicPr>
-            <a:picLocks noChangeAspect="1"/>
-          </p:cNvPicPr>
-          <p:nvPr/>
-        </p:nvPicPr>
-        <p:blipFill>
-          <a:blip r:embed="rId2"/>
-          <a:stretch>
-            <a:fillRect/>
-          </a:stretch>
-        </p:blipFill>
-        <p:spPr>
-          <a:xfrm>
-            <a:off x="5912720" y="3804634"/>
-            <a:ext cx="2679700" cy="3035300"/>
-          </a:xfrm>
-          <a:prstGeom prst="rect">
-            <a:avLst/>
-          </a:prstGeom>
-        </p:spPr>
-      </p:pic>
-    </p:spTree>
-    <p:extLst>
-      <p:ext uri="{BB962C8B-B14F-4D97-AF65-F5344CB8AC3E}">
-        <p14:creationId xmlns:p14="http://schemas.microsoft.com/office/powerpoint/2010/main" val="1587552421"/>
-      </p:ext>
-    </p:extLst>
-  </p:cSld>
-  <p:clrMapOvr>
-    <a:masterClrMapping/>
-  </p:clrMapOvr>
-</p:sld>
-</file>
-
-<file path=ppt/slides/slide9.xml><?xml version="1.0" encoding="utf-8"?>
-<p:sld xmlns:a="http://schemas.openxmlformats.org/drawingml/2006/main" xmlns:r="http://schemas.openxmlformats.org/officeDocument/2006/relationships" xmlns:p="http://schemas.openxmlformats.org/presentationml/2006/main">
-  <p:cSld>
-    <p:spTree>
-      <p:nvGrpSpPr>
-        <p:cNvPr id="1" name=""/>
-        <p:cNvGrpSpPr/>
-        <p:nvPr/>
-      </p:nvGrpSpPr>
-      <p:grpSpPr>
-        <a:xfrm>
-          <a:off x="0" y="0"/>
-          <a:ext cx="0" cy="0"/>
-          <a:chOff x="0" y="0"/>
-          <a:chExt cx="0" cy="0"/>
-        </a:xfrm>
-      </p:grpSpPr>
-      <p:sp>
-        <p:nvSpPr>
-          <p:cNvPr id="2" name="Title 1"/>
-          <p:cNvSpPr>
-            <a:spLocks noGrp="1"/>
-          </p:cNvSpPr>
-          <p:nvPr>
-            <p:ph type="title"/>
-          </p:nvPr>
-        </p:nvSpPr>
-        <p:spPr/>
-        <p:txBody>
-          <a:bodyPr/>
-          <a:lstStyle/>
-          <a:p>
-            <a:r>
-              <a:rPr lang="en-US" altLang="x-none" dirty="0"/>
-              <a:t>Commands for files &amp; </a:t>
-            </a:r>
-            <a:r>
-              <a:rPr lang="en-US" altLang="x-none" dirty="0" err="1"/>
-              <a:t>dirs</a:t>
-            </a:r>
-            <a:endParaRPr lang="en-US" dirty="0"/>
-          </a:p>
-        </p:txBody>
-      </p:sp>
-      <p:sp>
-        <p:nvSpPr>
-          <p:cNvPr id="3" name="Content Placeholder 2"/>
-          <p:cNvSpPr>
-            <a:spLocks noGrp="1"/>
-          </p:cNvSpPr>
-          <p:nvPr>
-            <p:ph idx="1"/>
-          </p:nvPr>
-        </p:nvSpPr>
-        <p:spPr/>
-        <p:txBody>
-          <a:bodyPr/>
-          <a:lstStyle/>
-          <a:p>
-            <a:pPr marL="457200" indent="-457200">
-              <a:buFont typeface="Arial" charset="0"/>
-              <a:buChar char="•"/>
-            </a:pPr>
-            <a:r>
-              <a:rPr lang="en-US" altLang="x-none" dirty="0"/>
-              <a:t>By category</a:t>
-            </a:r>
-          </a:p>
-          <a:p>
-            <a:pPr marL="857250" lvl="1" indent="-457200">
-              <a:buFont typeface="Arial" charset="0"/>
-              <a:buChar char="•"/>
-            </a:pPr>
-            <a:r>
-              <a:rPr lang="en-US" altLang="x-none" dirty="0"/>
-              <a:t>Create</a:t>
-            </a:r>
-          </a:p>
-          <a:p>
-            <a:pPr marL="1257300" lvl="2" indent="-457200">
-              <a:buFont typeface="Arial" charset="0"/>
-              <a:buChar char="•"/>
-            </a:pPr>
-            <a:r>
-              <a:rPr lang="en-US" altLang="x-none" dirty="0"/>
-              <a:t>Directory: </a:t>
-            </a:r>
-            <a:r>
-              <a:rPr lang="en-US" altLang="x-none" dirty="0" err="1">
-                <a:latin typeface="Courier New" charset="0"/>
-              </a:rPr>
-              <a:t>mkdir</a:t>
-            </a:r>
-            <a:endParaRPr lang="en-US" altLang="x-none" dirty="0">
-              <a:latin typeface="Courier New" charset="0"/>
-            </a:endParaRPr>
-          </a:p>
-          <a:p>
-            <a:pPr marL="1257300" lvl="2" indent="-457200">
-              <a:buFont typeface="Arial" charset="0"/>
-              <a:buChar char="•"/>
-            </a:pPr>
-            <a:r>
-              <a:rPr lang="en-US" altLang="x-none" dirty="0"/>
-              <a:t>File: various (e.g., </a:t>
-            </a:r>
-            <a:r>
-              <a:rPr lang="en-US" altLang="x-none" dirty="0" err="1">
-                <a:latin typeface="Courier New" charset="0"/>
-              </a:rPr>
-              <a:t>cp</a:t>
-            </a:r>
-            <a:r>
-              <a:rPr lang="en-US" altLang="x-none" dirty="0">
-                <a:latin typeface="Courier New" charset="0"/>
-              </a:rPr>
-              <a:t>, touch</a:t>
-            </a:r>
-            <a:r>
-              <a:rPr lang="en-US" altLang="x-none" dirty="0"/>
-              <a:t>)</a:t>
-            </a:r>
-          </a:p>
-          <a:p>
-            <a:pPr marL="857250" lvl="1" indent="-457200">
-              <a:buFont typeface="Arial" charset="0"/>
-              <a:buChar char="•"/>
-            </a:pPr>
-            <a:r>
-              <a:rPr lang="en-US" altLang="x-none" dirty="0"/>
-              <a:t>View contents</a:t>
-            </a:r>
-          </a:p>
-          <a:p>
-            <a:pPr marL="1257300" lvl="2" indent="-457200">
-              <a:buFont typeface="Arial" charset="0"/>
-              <a:buChar char="•"/>
-            </a:pPr>
-            <a:r>
-              <a:rPr lang="en-US" altLang="x-none" dirty="0"/>
-              <a:t>Directory: </a:t>
-            </a:r>
-            <a:r>
-              <a:rPr lang="en-US" altLang="x-none" dirty="0">
-                <a:latin typeface="Courier New" charset="0"/>
-              </a:rPr>
-              <a:t>ls</a:t>
-            </a:r>
-          </a:p>
-          <a:p>
-            <a:pPr marL="1257300" lvl="2" indent="-457200">
-              <a:buFont typeface="Arial" charset="0"/>
-              <a:buChar char="•"/>
-            </a:pPr>
-            <a:r>
-              <a:rPr lang="en-US" altLang="x-none" dirty="0"/>
-              <a:t>File: </a:t>
-            </a:r>
-            <a:r>
-              <a:rPr lang="en-US" altLang="x-none" dirty="0">
-                <a:latin typeface="Courier New" charset="0"/>
-              </a:rPr>
-              <a:t>cat</a:t>
-            </a:r>
-          </a:p>
-          <a:p>
-            <a:pPr marL="857250" lvl="1" indent="-457200">
-              <a:buFont typeface="Arial" charset="0"/>
-              <a:buChar char="•"/>
-            </a:pPr>
-            <a:r>
-              <a:rPr lang="en-US" altLang="x-none" dirty="0"/>
-              <a:t>Remove</a:t>
-            </a:r>
-          </a:p>
-          <a:p>
-            <a:pPr marL="1257300" lvl="2" indent="-457200">
-              <a:buFont typeface="Arial" charset="0"/>
-              <a:buChar char="•"/>
-            </a:pPr>
-            <a:r>
-              <a:rPr lang="en-US" altLang="x-none" dirty="0"/>
-              <a:t>Directory: </a:t>
-            </a:r>
-            <a:r>
-              <a:rPr lang="en-US" altLang="x-none" dirty="0" err="1">
-                <a:latin typeface="Courier New" charset="0"/>
-              </a:rPr>
-              <a:t>rmdir</a:t>
-            </a:r>
-            <a:endParaRPr lang="en-US" altLang="x-none" dirty="0">
-              <a:latin typeface="Courier New" charset="0"/>
-            </a:endParaRPr>
-          </a:p>
-          <a:p>
-            <a:pPr marL="1257300" lvl="2" indent="-457200">
-              <a:buFont typeface="Arial" charset="0"/>
-              <a:buChar char="•"/>
-            </a:pPr>
-            <a:r>
-              <a:rPr lang="en-US" altLang="x-none" dirty="0"/>
-              <a:t>File: </a:t>
-            </a:r>
-            <a:r>
-              <a:rPr lang="en-US" altLang="x-none" dirty="0" err="1">
-                <a:latin typeface="Courier New" charset="0"/>
-              </a:rPr>
-              <a:t>rm</a:t>
-            </a:r>
-            <a:endParaRPr lang="en-US" altLang="x-none" dirty="0">
-              <a:latin typeface="Courier New" charset="0"/>
-            </a:endParaRPr>
-          </a:p>
-        </p:txBody>
-      </p:sp>
-    </p:spTree>
-    <p:extLst>
-      <p:ext uri="{BB962C8B-B14F-4D97-AF65-F5344CB8AC3E}">
-        <p14:creationId xmlns:p14="http://schemas.microsoft.com/office/powerpoint/2010/main" val="1184325561"/>
-      </p:ext>
-    </p:extLst>
-  </p:cSld>
-  <p:clrMapOvr>
-    <a:masterClrMapping/>
-  </p:clrMapOvr>
 </p:sld>
 </file>
 

</xml_diff>